<commit_message>
First set of corrections - ch 1-3
</commit_message>
<xml_diff>
--- a/lag sim recon figure/lag sim recon.pptx
+++ b/lag sim recon figure/lag sim recon.pptx
@@ -2,12 +2,12 @@
 <file path=ppt/presentation.xml><?xml version="1.0" encoding="utf-8"?>
 <p:presentation xmlns:a="http://schemas.openxmlformats.org/drawingml/2006/main" xmlns:r="http://schemas.openxmlformats.org/officeDocument/2006/relationships" xmlns:p="http://schemas.openxmlformats.org/presentationml/2006/main" saveSubsetFonts="1">
   <p:sldMasterIdLst>
-    <p:sldMasterId id="2147483660" r:id="rId1"/>
+    <p:sldMasterId id="2147483684" r:id="rId1"/>
   </p:sldMasterIdLst>
   <p:sldIdLst>
     <p:sldId id="256" r:id="rId2"/>
   </p:sldIdLst>
-  <p:sldSz cx="8280400" cy="4608513"/>
+  <p:sldSz cx="8280400" cy="5040313"/>
   <p:notesSz cx="6858000" cy="9144000"/>
   <p:defaultTextStyle>
     <a:defPPr>
@@ -104,6 +104,11 @@
       </a:defRPr>
     </a:lvl9pPr>
   </p:defaultTextStyle>
+  <p:extLst>
+    <p:ext uri="{EFAFB233-063F-42B5-8137-9DF3F51BA10A}">
+      <p15:sldGuideLst xmlns:p15="http://schemas.microsoft.com/office/powerpoint/2012/main"/>
+    </p:ext>
+  </p:extLst>
 </p:presentation>
 </file>
 
@@ -136,15 +141,15 @@
         </p:nvSpPr>
         <p:spPr>
           <a:xfrm>
-            <a:off x="1035050" y="754218"/>
-            <a:ext cx="6210300" cy="1604445"/>
+            <a:off x="1035050" y="824885"/>
+            <a:ext cx="6210300" cy="1754776"/>
           </a:xfrm>
         </p:spPr>
         <p:txBody>
           <a:bodyPr anchor="b"/>
           <a:lstStyle>
             <a:lvl1pPr algn="ctr">
-              <a:defRPr sz="4032"/>
+              <a:defRPr sz="4075"/>
             </a:lvl1pPr>
           </a:lstStyle>
           <a:p>
@@ -168,8 +173,8 @@
         </p:nvSpPr>
         <p:spPr>
           <a:xfrm>
-            <a:off x="1035050" y="2420536"/>
-            <a:ext cx="6210300" cy="1112657"/>
+            <a:off x="1035050" y="2647331"/>
+            <a:ext cx="6210300" cy="1216909"/>
           </a:xfrm>
         </p:spPr>
         <p:txBody>
@@ -177,39 +182,39 @@
           <a:lstStyle>
             <a:lvl1pPr marL="0" indent="0" algn="ctr">
               <a:buNone/>
-              <a:defRPr sz="1613"/>
+              <a:defRPr sz="1630"/>
             </a:lvl1pPr>
-            <a:lvl2pPr marL="307238" indent="0" algn="ctr">
-              <a:buNone/>
-              <a:defRPr sz="1344"/>
+            <a:lvl2pPr marL="310530" indent="0" algn="ctr">
+              <a:buNone/>
+              <a:defRPr sz="1358"/>
             </a:lvl2pPr>
-            <a:lvl3pPr marL="614477" indent="0" algn="ctr">
-              <a:buNone/>
-              <a:defRPr sz="1210"/>
+            <a:lvl3pPr marL="621060" indent="0" algn="ctr">
+              <a:buNone/>
+              <a:defRPr sz="1223"/>
             </a:lvl3pPr>
-            <a:lvl4pPr marL="921715" indent="0" algn="ctr">
-              <a:buNone/>
-              <a:defRPr sz="1075"/>
+            <a:lvl4pPr marL="931591" indent="0" algn="ctr">
+              <a:buNone/>
+              <a:defRPr sz="1087"/>
             </a:lvl4pPr>
-            <a:lvl5pPr marL="1228954" indent="0" algn="ctr">
-              <a:buNone/>
-              <a:defRPr sz="1075"/>
+            <a:lvl5pPr marL="1242121" indent="0" algn="ctr">
+              <a:buNone/>
+              <a:defRPr sz="1087"/>
             </a:lvl5pPr>
-            <a:lvl6pPr marL="1536192" indent="0" algn="ctr">
-              <a:buNone/>
-              <a:defRPr sz="1075"/>
+            <a:lvl6pPr marL="1552651" indent="0" algn="ctr">
+              <a:buNone/>
+              <a:defRPr sz="1087"/>
             </a:lvl6pPr>
-            <a:lvl7pPr marL="1843430" indent="0" algn="ctr">
-              <a:buNone/>
-              <a:defRPr sz="1075"/>
+            <a:lvl7pPr marL="1863181" indent="0" algn="ctr">
+              <a:buNone/>
+              <a:defRPr sz="1087"/>
             </a:lvl7pPr>
-            <a:lvl8pPr marL="2150669" indent="0" algn="ctr">
-              <a:buNone/>
-              <a:defRPr sz="1075"/>
+            <a:lvl8pPr marL="2173712" indent="0" algn="ctr">
+              <a:buNone/>
+              <a:defRPr sz="1087"/>
             </a:lvl8pPr>
-            <a:lvl9pPr marL="2457907" indent="0" algn="ctr">
-              <a:buNone/>
-              <a:defRPr sz="1075"/>
+            <a:lvl9pPr marL="2484242" indent="0" algn="ctr">
+              <a:buNone/>
+              <a:defRPr sz="1087"/>
             </a:lvl9pPr>
           </a:lstStyle>
           <a:p>
@@ -238,7 +243,7 @@
           <a:p>
             <a:fld id="{D4DB1356-5F01-43EB-828D-BA428F19442C}" type="datetimeFigureOut">
               <a:rPr lang="en-GB" smtClean="0"/>
-              <a:t>27/08/2018</a:t>
+              <a:t>21/10/2018</a:t>
             </a:fld>
             <a:endParaRPr lang="en-GB"/>
           </a:p>
@@ -289,7 +294,7 @@
     </p:spTree>
     <p:extLst>
       <p:ext uri="{BB962C8B-B14F-4D97-AF65-F5344CB8AC3E}">
-        <p14:creationId xmlns:p14="http://schemas.microsoft.com/office/powerpoint/2010/main" val="2197509140"/>
+        <p14:creationId xmlns:p14="http://schemas.microsoft.com/office/powerpoint/2010/main" val="1511069449"/>
       </p:ext>
     </p:extLst>
   </p:cSld>
@@ -408,7 +413,7 @@
           <a:p>
             <a:fld id="{D4DB1356-5F01-43EB-828D-BA428F19442C}" type="datetimeFigureOut">
               <a:rPr lang="en-GB" smtClean="0"/>
-              <a:t>27/08/2018</a:t>
+              <a:t>21/10/2018</a:t>
             </a:fld>
             <a:endParaRPr lang="en-GB"/>
           </a:p>
@@ -459,7 +464,7 @@
     </p:spTree>
     <p:extLst>
       <p:ext uri="{BB962C8B-B14F-4D97-AF65-F5344CB8AC3E}">
-        <p14:creationId xmlns:p14="http://schemas.microsoft.com/office/powerpoint/2010/main" val="1978623553"/>
+        <p14:creationId xmlns:p14="http://schemas.microsoft.com/office/powerpoint/2010/main" val="787510429"/>
       </p:ext>
     </p:extLst>
   </p:cSld>
@@ -498,8 +503,8 @@
         </p:nvSpPr>
         <p:spPr>
           <a:xfrm>
-            <a:off x="5925661" y="245361"/>
-            <a:ext cx="1785461" cy="3905502"/>
+            <a:off x="5925661" y="268350"/>
+            <a:ext cx="1785461" cy="4271432"/>
           </a:xfrm>
         </p:spPr>
         <p:txBody>
@@ -526,8 +531,8 @@
         </p:nvSpPr>
         <p:spPr>
           <a:xfrm>
-            <a:off x="569277" y="245361"/>
-            <a:ext cx="5252879" cy="3905502"/>
+            <a:off x="569277" y="268350"/>
+            <a:ext cx="5252879" cy="4271432"/>
           </a:xfrm>
         </p:spPr>
         <p:txBody>
@@ -588,7 +593,7 @@
           <a:p>
             <a:fld id="{D4DB1356-5F01-43EB-828D-BA428F19442C}" type="datetimeFigureOut">
               <a:rPr lang="en-GB" smtClean="0"/>
-              <a:t>27/08/2018</a:t>
+              <a:t>21/10/2018</a:t>
             </a:fld>
             <a:endParaRPr lang="en-GB"/>
           </a:p>
@@ -639,7 +644,7 @@
     </p:spTree>
     <p:extLst>
       <p:ext uri="{BB962C8B-B14F-4D97-AF65-F5344CB8AC3E}">
-        <p14:creationId xmlns:p14="http://schemas.microsoft.com/office/powerpoint/2010/main" val="268299260"/>
+        <p14:creationId xmlns:p14="http://schemas.microsoft.com/office/powerpoint/2010/main" val="141047641"/>
       </p:ext>
     </p:extLst>
   </p:cSld>
@@ -758,7 +763,7 @@
           <a:p>
             <a:fld id="{D4DB1356-5F01-43EB-828D-BA428F19442C}" type="datetimeFigureOut">
               <a:rPr lang="en-GB" smtClean="0"/>
-              <a:t>27/08/2018</a:t>
+              <a:t>21/10/2018</a:t>
             </a:fld>
             <a:endParaRPr lang="en-GB"/>
           </a:p>
@@ -809,7 +814,7 @@
     </p:spTree>
     <p:extLst>
       <p:ext uri="{BB962C8B-B14F-4D97-AF65-F5344CB8AC3E}">
-        <p14:creationId xmlns:p14="http://schemas.microsoft.com/office/powerpoint/2010/main" val="3730280918"/>
+        <p14:creationId xmlns:p14="http://schemas.microsoft.com/office/powerpoint/2010/main" val="3318747398"/>
       </p:ext>
     </p:extLst>
   </p:cSld>
@@ -848,15 +853,15 @@
         </p:nvSpPr>
         <p:spPr>
           <a:xfrm>
-            <a:off x="564965" y="1148929"/>
-            <a:ext cx="7141845" cy="1917013"/>
+            <a:off x="564965" y="1256579"/>
+            <a:ext cx="7141845" cy="2096630"/>
           </a:xfrm>
         </p:spPr>
         <p:txBody>
           <a:bodyPr anchor="b"/>
           <a:lstStyle>
             <a:lvl1pPr>
-              <a:defRPr sz="4032"/>
+              <a:defRPr sz="4075"/>
             </a:lvl1pPr>
           </a:lstStyle>
           <a:p>
@@ -880,8 +885,8 @@
         </p:nvSpPr>
         <p:spPr>
           <a:xfrm>
-            <a:off x="564965" y="3084077"/>
-            <a:ext cx="7141845" cy="1008112"/>
+            <a:off x="564965" y="3373044"/>
+            <a:ext cx="7141845" cy="1102568"/>
           </a:xfrm>
         </p:spPr>
         <p:txBody>
@@ -889,7 +894,7 @@
           <a:lstStyle>
             <a:lvl1pPr marL="0" indent="0">
               <a:buNone/>
-              <a:defRPr sz="1613">
+              <a:defRPr sz="1630">
                 <a:solidFill>
                   <a:schemeClr val="tx1">
                     <a:tint val="75000"/>
@@ -897,9 +902,9 @@
                 </a:solidFill>
               </a:defRPr>
             </a:lvl1pPr>
-            <a:lvl2pPr marL="307238" indent="0">
-              <a:buNone/>
-              <a:defRPr sz="1344">
+            <a:lvl2pPr marL="310530" indent="0">
+              <a:buNone/>
+              <a:defRPr sz="1358">
                 <a:solidFill>
                   <a:schemeClr val="tx1">
                     <a:tint val="75000"/>
@@ -907,9 +912,9 @@
                 </a:solidFill>
               </a:defRPr>
             </a:lvl2pPr>
-            <a:lvl3pPr marL="614477" indent="0">
-              <a:buNone/>
-              <a:defRPr sz="1210">
+            <a:lvl3pPr marL="621060" indent="0">
+              <a:buNone/>
+              <a:defRPr sz="1223">
                 <a:solidFill>
                   <a:schemeClr val="tx1">
                     <a:tint val="75000"/>
@@ -917,9 +922,9 @@
                 </a:solidFill>
               </a:defRPr>
             </a:lvl3pPr>
-            <a:lvl4pPr marL="921715" indent="0">
-              <a:buNone/>
-              <a:defRPr sz="1075">
+            <a:lvl4pPr marL="931591" indent="0">
+              <a:buNone/>
+              <a:defRPr sz="1087">
                 <a:solidFill>
                   <a:schemeClr val="tx1">
                     <a:tint val="75000"/>
@@ -927,9 +932,9 @@
                 </a:solidFill>
               </a:defRPr>
             </a:lvl4pPr>
-            <a:lvl5pPr marL="1228954" indent="0">
-              <a:buNone/>
-              <a:defRPr sz="1075">
+            <a:lvl5pPr marL="1242121" indent="0">
+              <a:buNone/>
+              <a:defRPr sz="1087">
                 <a:solidFill>
                   <a:schemeClr val="tx1">
                     <a:tint val="75000"/>
@@ -937,9 +942,9 @@
                 </a:solidFill>
               </a:defRPr>
             </a:lvl5pPr>
-            <a:lvl6pPr marL="1536192" indent="0">
-              <a:buNone/>
-              <a:defRPr sz="1075">
+            <a:lvl6pPr marL="1552651" indent="0">
+              <a:buNone/>
+              <a:defRPr sz="1087">
                 <a:solidFill>
                   <a:schemeClr val="tx1">
                     <a:tint val="75000"/>
@@ -947,9 +952,9 @@
                 </a:solidFill>
               </a:defRPr>
             </a:lvl6pPr>
-            <a:lvl7pPr marL="1843430" indent="0">
-              <a:buNone/>
-              <a:defRPr sz="1075">
+            <a:lvl7pPr marL="1863181" indent="0">
+              <a:buNone/>
+              <a:defRPr sz="1087">
                 <a:solidFill>
                   <a:schemeClr val="tx1">
                     <a:tint val="75000"/>
@@ -957,9 +962,9 @@
                 </a:solidFill>
               </a:defRPr>
             </a:lvl7pPr>
-            <a:lvl8pPr marL="2150669" indent="0">
-              <a:buNone/>
-              <a:defRPr sz="1075">
+            <a:lvl8pPr marL="2173712" indent="0">
+              <a:buNone/>
+              <a:defRPr sz="1087">
                 <a:solidFill>
                   <a:schemeClr val="tx1">
                     <a:tint val="75000"/>
@@ -967,9 +972,9 @@
                 </a:solidFill>
               </a:defRPr>
             </a:lvl8pPr>
-            <a:lvl9pPr marL="2457907" indent="0">
-              <a:buNone/>
-              <a:defRPr sz="1075">
+            <a:lvl9pPr marL="2484242" indent="0">
+              <a:buNone/>
+              <a:defRPr sz="1087">
                 <a:solidFill>
                   <a:schemeClr val="tx1">
                     <a:tint val="75000"/>
@@ -1004,7 +1009,7 @@
           <a:p>
             <a:fld id="{D4DB1356-5F01-43EB-828D-BA428F19442C}" type="datetimeFigureOut">
               <a:rPr lang="en-GB" smtClean="0"/>
-              <a:t>27/08/2018</a:t>
+              <a:t>21/10/2018</a:t>
             </a:fld>
             <a:endParaRPr lang="en-GB"/>
           </a:p>
@@ -1055,7 +1060,7 @@
     </p:spTree>
     <p:extLst>
       <p:ext uri="{BB962C8B-B14F-4D97-AF65-F5344CB8AC3E}">
-        <p14:creationId xmlns:p14="http://schemas.microsoft.com/office/powerpoint/2010/main" val="806297991"/>
+        <p14:creationId xmlns:p14="http://schemas.microsoft.com/office/powerpoint/2010/main" val="2393926689"/>
       </p:ext>
     </p:extLst>
   </p:cSld>
@@ -1117,8 +1122,8 @@
         </p:nvSpPr>
         <p:spPr>
           <a:xfrm>
-            <a:off x="569278" y="1226803"/>
-            <a:ext cx="3519170" cy="2924059"/>
+            <a:off x="569278" y="1341750"/>
+            <a:ext cx="3519170" cy="3198032"/>
           </a:xfrm>
         </p:spPr>
         <p:txBody>
@@ -1174,8 +1179,8 @@
         </p:nvSpPr>
         <p:spPr>
           <a:xfrm>
-            <a:off x="4191953" y="1226803"/>
-            <a:ext cx="3519170" cy="2924059"/>
+            <a:off x="4191953" y="1341750"/>
+            <a:ext cx="3519170" cy="3198032"/>
           </a:xfrm>
         </p:spPr>
         <p:txBody>
@@ -1236,7 +1241,7 @@
           <a:p>
             <a:fld id="{D4DB1356-5F01-43EB-828D-BA428F19442C}" type="datetimeFigureOut">
               <a:rPr lang="en-GB" smtClean="0"/>
-              <a:t>27/08/2018</a:t>
+              <a:t>21/10/2018</a:t>
             </a:fld>
             <a:endParaRPr lang="en-GB"/>
           </a:p>
@@ -1287,7 +1292,7 @@
     </p:spTree>
     <p:extLst>
       <p:ext uri="{BB962C8B-B14F-4D97-AF65-F5344CB8AC3E}">
-        <p14:creationId xmlns:p14="http://schemas.microsoft.com/office/powerpoint/2010/main" val="3722903571"/>
+        <p14:creationId xmlns:p14="http://schemas.microsoft.com/office/powerpoint/2010/main" val="1907226855"/>
       </p:ext>
     </p:extLst>
   </p:cSld>
@@ -1326,8 +1331,8 @@
         </p:nvSpPr>
         <p:spPr>
           <a:xfrm>
-            <a:off x="570356" y="245361"/>
-            <a:ext cx="7141845" cy="890766"/>
+            <a:off x="570356" y="268350"/>
+            <a:ext cx="7141845" cy="974228"/>
           </a:xfrm>
         </p:spPr>
         <p:txBody>
@@ -1354,8 +1359,8 @@
         </p:nvSpPr>
         <p:spPr>
           <a:xfrm>
-            <a:off x="570356" y="1129726"/>
-            <a:ext cx="3502997" cy="553661"/>
+            <a:off x="570356" y="1235577"/>
+            <a:ext cx="3502997" cy="605537"/>
           </a:xfrm>
         </p:spPr>
         <p:txBody>
@@ -1363,39 +1368,39 @@
           <a:lstStyle>
             <a:lvl1pPr marL="0" indent="0">
               <a:buNone/>
-              <a:defRPr sz="1613" b="1"/>
+              <a:defRPr sz="1630" b="1"/>
             </a:lvl1pPr>
-            <a:lvl2pPr marL="307238" indent="0">
-              <a:buNone/>
-              <a:defRPr sz="1344" b="1"/>
+            <a:lvl2pPr marL="310530" indent="0">
+              <a:buNone/>
+              <a:defRPr sz="1358" b="1"/>
             </a:lvl2pPr>
-            <a:lvl3pPr marL="614477" indent="0">
-              <a:buNone/>
-              <a:defRPr sz="1210" b="1"/>
+            <a:lvl3pPr marL="621060" indent="0">
+              <a:buNone/>
+              <a:defRPr sz="1223" b="1"/>
             </a:lvl3pPr>
-            <a:lvl4pPr marL="921715" indent="0">
-              <a:buNone/>
-              <a:defRPr sz="1075" b="1"/>
+            <a:lvl4pPr marL="931591" indent="0">
+              <a:buNone/>
+              <a:defRPr sz="1087" b="1"/>
             </a:lvl4pPr>
-            <a:lvl5pPr marL="1228954" indent="0">
-              <a:buNone/>
-              <a:defRPr sz="1075" b="1"/>
+            <a:lvl5pPr marL="1242121" indent="0">
+              <a:buNone/>
+              <a:defRPr sz="1087" b="1"/>
             </a:lvl5pPr>
-            <a:lvl6pPr marL="1536192" indent="0">
-              <a:buNone/>
-              <a:defRPr sz="1075" b="1"/>
+            <a:lvl6pPr marL="1552651" indent="0">
+              <a:buNone/>
+              <a:defRPr sz="1087" b="1"/>
             </a:lvl6pPr>
-            <a:lvl7pPr marL="1843430" indent="0">
-              <a:buNone/>
-              <a:defRPr sz="1075" b="1"/>
+            <a:lvl7pPr marL="1863181" indent="0">
+              <a:buNone/>
+              <a:defRPr sz="1087" b="1"/>
             </a:lvl7pPr>
-            <a:lvl8pPr marL="2150669" indent="0">
-              <a:buNone/>
-              <a:defRPr sz="1075" b="1"/>
+            <a:lvl8pPr marL="2173712" indent="0">
+              <a:buNone/>
+              <a:defRPr sz="1087" b="1"/>
             </a:lvl8pPr>
-            <a:lvl9pPr marL="2457907" indent="0">
-              <a:buNone/>
-              <a:defRPr sz="1075" b="1"/>
+            <a:lvl9pPr marL="2484242" indent="0">
+              <a:buNone/>
+              <a:defRPr sz="1087" b="1"/>
             </a:lvl9pPr>
           </a:lstStyle>
           <a:p>
@@ -1419,8 +1424,8 @@
         </p:nvSpPr>
         <p:spPr>
           <a:xfrm>
-            <a:off x="570356" y="1683388"/>
-            <a:ext cx="3502997" cy="2476009"/>
+            <a:off x="570356" y="1841114"/>
+            <a:ext cx="3502997" cy="2708002"/>
           </a:xfrm>
         </p:spPr>
         <p:txBody>
@@ -1476,8 +1481,8 @@
         </p:nvSpPr>
         <p:spPr>
           <a:xfrm>
-            <a:off x="4191952" y="1129726"/>
-            <a:ext cx="3520249" cy="553661"/>
+            <a:off x="4191952" y="1235577"/>
+            <a:ext cx="3520249" cy="605537"/>
           </a:xfrm>
         </p:spPr>
         <p:txBody>
@@ -1485,39 +1490,39 @@
           <a:lstStyle>
             <a:lvl1pPr marL="0" indent="0">
               <a:buNone/>
-              <a:defRPr sz="1613" b="1"/>
+              <a:defRPr sz="1630" b="1"/>
             </a:lvl1pPr>
-            <a:lvl2pPr marL="307238" indent="0">
-              <a:buNone/>
-              <a:defRPr sz="1344" b="1"/>
+            <a:lvl2pPr marL="310530" indent="0">
+              <a:buNone/>
+              <a:defRPr sz="1358" b="1"/>
             </a:lvl2pPr>
-            <a:lvl3pPr marL="614477" indent="0">
-              <a:buNone/>
-              <a:defRPr sz="1210" b="1"/>
+            <a:lvl3pPr marL="621060" indent="0">
+              <a:buNone/>
+              <a:defRPr sz="1223" b="1"/>
             </a:lvl3pPr>
-            <a:lvl4pPr marL="921715" indent="0">
-              <a:buNone/>
-              <a:defRPr sz="1075" b="1"/>
+            <a:lvl4pPr marL="931591" indent="0">
+              <a:buNone/>
+              <a:defRPr sz="1087" b="1"/>
             </a:lvl4pPr>
-            <a:lvl5pPr marL="1228954" indent="0">
-              <a:buNone/>
-              <a:defRPr sz="1075" b="1"/>
+            <a:lvl5pPr marL="1242121" indent="0">
+              <a:buNone/>
+              <a:defRPr sz="1087" b="1"/>
             </a:lvl5pPr>
-            <a:lvl6pPr marL="1536192" indent="0">
-              <a:buNone/>
-              <a:defRPr sz="1075" b="1"/>
+            <a:lvl6pPr marL="1552651" indent="0">
+              <a:buNone/>
+              <a:defRPr sz="1087" b="1"/>
             </a:lvl6pPr>
-            <a:lvl7pPr marL="1843430" indent="0">
-              <a:buNone/>
-              <a:defRPr sz="1075" b="1"/>
+            <a:lvl7pPr marL="1863181" indent="0">
+              <a:buNone/>
+              <a:defRPr sz="1087" b="1"/>
             </a:lvl7pPr>
-            <a:lvl8pPr marL="2150669" indent="0">
-              <a:buNone/>
-              <a:defRPr sz="1075" b="1"/>
+            <a:lvl8pPr marL="2173712" indent="0">
+              <a:buNone/>
+              <a:defRPr sz="1087" b="1"/>
             </a:lvl8pPr>
-            <a:lvl9pPr marL="2457907" indent="0">
-              <a:buNone/>
-              <a:defRPr sz="1075" b="1"/>
+            <a:lvl9pPr marL="2484242" indent="0">
+              <a:buNone/>
+              <a:defRPr sz="1087" b="1"/>
             </a:lvl9pPr>
           </a:lstStyle>
           <a:p>
@@ -1541,8 +1546,8 @@
         </p:nvSpPr>
         <p:spPr>
           <a:xfrm>
-            <a:off x="4191952" y="1683388"/>
-            <a:ext cx="3520249" cy="2476009"/>
+            <a:off x="4191952" y="1841114"/>
+            <a:ext cx="3520249" cy="2708002"/>
           </a:xfrm>
         </p:spPr>
         <p:txBody>
@@ -1603,7 +1608,7 @@
           <a:p>
             <a:fld id="{D4DB1356-5F01-43EB-828D-BA428F19442C}" type="datetimeFigureOut">
               <a:rPr lang="en-GB" smtClean="0"/>
-              <a:t>27/08/2018</a:t>
+              <a:t>21/10/2018</a:t>
             </a:fld>
             <a:endParaRPr lang="en-GB"/>
           </a:p>
@@ -1654,7 +1659,7 @@
     </p:spTree>
     <p:extLst>
       <p:ext uri="{BB962C8B-B14F-4D97-AF65-F5344CB8AC3E}">
-        <p14:creationId xmlns:p14="http://schemas.microsoft.com/office/powerpoint/2010/main" val="71646953"/>
+        <p14:creationId xmlns:p14="http://schemas.microsoft.com/office/powerpoint/2010/main" val="2111005526"/>
       </p:ext>
     </p:extLst>
   </p:cSld>
@@ -1721,7 +1726,7 @@
           <a:p>
             <a:fld id="{D4DB1356-5F01-43EB-828D-BA428F19442C}" type="datetimeFigureOut">
               <a:rPr lang="en-GB" smtClean="0"/>
-              <a:t>27/08/2018</a:t>
+              <a:t>21/10/2018</a:t>
             </a:fld>
             <a:endParaRPr lang="en-GB"/>
           </a:p>
@@ -1772,7 +1777,7 @@
     </p:spTree>
     <p:extLst>
       <p:ext uri="{BB962C8B-B14F-4D97-AF65-F5344CB8AC3E}">
-        <p14:creationId xmlns:p14="http://schemas.microsoft.com/office/powerpoint/2010/main" val="3808011191"/>
+        <p14:creationId xmlns:p14="http://schemas.microsoft.com/office/powerpoint/2010/main" val="2863840176"/>
       </p:ext>
     </p:extLst>
   </p:cSld>
@@ -1816,7 +1821,7 @@
           <a:p>
             <a:fld id="{D4DB1356-5F01-43EB-828D-BA428F19442C}" type="datetimeFigureOut">
               <a:rPr lang="en-GB" smtClean="0"/>
-              <a:t>27/08/2018</a:t>
+              <a:t>21/10/2018</a:t>
             </a:fld>
             <a:endParaRPr lang="en-GB"/>
           </a:p>
@@ -1867,7 +1872,7 @@
     </p:spTree>
     <p:extLst>
       <p:ext uri="{BB962C8B-B14F-4D97-AF65-F5344CB8AC3E}">
-        <p14:creationId xmlns:p14="http://schemas.microsoft.com/office/powerpoint/2010/main" val="3834903737"/>
+        <p14:creationId xmlns:p14="http://schemas.microsoft.com/office/powerpoint/2010/main" val="338679099"/>
       </p:ext>
     </p:extLst>
   </p:cSld>
@@ -1906,15 +1911,15 @@
         </p:nvSpPr>
         <p:spPr>
           <a:xfrm>
-            <a:off x="570357" y="307234"/>
-            <a:ext cx="2670644" cy="1075320"/>
+            <a:off x="570357" y="336021"/>
+            <a:ext cx="2670644" cy="1176073"/>
           </a:xfrm>
         </p:spPr>
         <p:txBody>
           <a:bodyPr anchor="b"/>
           <a:lstStyle>
             <a:lvl1pPr>
-              <a:defRPr sz="2150"/>
+              <a:defRPr sz="2173"/>
             </a:lvl1pPr>
           </a:lstStyle>
           <a:p>
@@ -1938,39 +1943,39 @@
         </p:nvSpPr>
         <p:spPr>
           <a:xfrm>
-            <a:off x="3520248" y="663541"/>
-            <a:ext cx="4191953" cy="3275031"/>
+            <a:off x="3520248" y="725712"/>
+            <a:ext cx="4191953" cy="3581889"/>
           </a:xfrm>
         </p:spPr>
         <p:txBody>
           <a:bodyPr/>
           <a:lstStyle>
             <a:lvl1pPr>
-              <a:defRPr sz="2150"/>
+              <a:defRPr sz="2173"/>
             </a:lvl1pPr>
             <a:lvl2pPr>
-              <a:defRPr sz="1882"/>
+              <a:defRPr sz="1902"/>
             </a:lvl2pPr>
             <a:lvl3pPr>
-              <a:defRPr sz="1613"/>
+              <a:defRPr sz="1630"/>
             </a:lvl3pPr>
             <a:lvl4pPr>
-              <a:defRPr sz="1344"/>
+              <a:defRPr sz="1358"/>
             </a:lvl4pPr>
             <a:lvl5pPr>
-              <a:defRPr sz="1344"/>
+              <a:defRPr sz="1358"/>
             </a:lvl5pPr>
             <a:lvl6pPr>
-              <a:defRPr sz="1344"/>
+              <a:defRPr sz="1358"/>
             </a:lvl6pPr>
             <a:lvl7pPr>
-              <a:defRPr sz="1344"/>
+              <a:defRPr sz="1358"/>
             </a:lvl7pPr>
             <a:lvl8pPr>
-              <a:defRPr sz="1344"/>
+              <a:defRPr sz="1358"/>
             </a:lvl8pPr>
             <a:lvl9pPr>
-              <a:defRPr sz="1344"/>
+              <a:defRPr sz="1358"/>
             </a:lvl9pPr>
           </a:lstStyle>
           <a:p>
@@ -2023,8 +2028,8 @@
         </p:nvSpPr>
         <p:spPr>
           <a:xfrm>
-            <a:off x="570357" y="1382554"/>
-            <a:ext cx="2670644" cy="2561352"/>
+            <a:off x="570357" y="1512094"/>
+            <a:ext cx="2670644" cy="2801341"/>
           </a:xfrm>
         </p:spPr>
         <p:txBody>
@@ -2032,39 +2037,39 @@
           <a:lstStyle>
             <a:lvl1pPr marL="0" indent="0">
               <a:buNone/>
-              <a:defRPr sz="1075"/>
+              <a:defRPr sz="1087"/>
             </a:lvl1pPr>
-            <a:lvl2pPr marL="307238" indent="0">
-              <a:buNone/>
-              <a:defRPr sz="941"/>
+            <a:lvl2pPr marL="310530" indent="0">
+              <a:buNone/>
+              <a:defRPr sz="951"/>
             </a:lvl2pPr>
-            <a:lvl3pPr marL="614477" indent="0">
-              <a:buNone/>
-              <a:defRPr sz="806"/>
+            <a:lvl3pPr marL="621060" indent="0">
+              <a:buNone/>
+              <a:defRPr sz="815"/>
             </a:lvl3pPr>
-            <a:lvl4pPr marL="921715" indent="0">
-              <a:buNone/>
-              <a:defRPr sz="672"/>
+            <a:lvl4pPr marL="931591" indent="0">
+              <a:buNone/>
+              <a:defRPr sz="679"/>
             </a:lvl4pPr>
-            <a:lvl5pPr marL="1228954" indent="0">
-              <a:buNone/>
-              <a:defRPr sz="672"/>
+            <a:lvl5pPr marL="1242121" indent="0">
+              <a:buNone/>
+              <a:defRPr sz="679"/>
             </a:lvl5pPr>
-            <a:lvl6pPr marL="1536192" indent="0">
-              <a:buNone/>
-              <a:defRPr sz="672"/>
+            <a:lvl6pPr marL="1552651" indent="0">
+              <a:buNone/>
+              <a:defRPr sz="679"/>
             </a:lvl6pPr>
-            <a:lvl7pPr marL="1843430" indent="0">
-              <a:buNone/>
-              <a:defRPr sz="672"/>
+            <a:lvl7pPr marL="1863181" indent="0">
+              <a:buNone/>
+              <a:defRPr sz="679"/>
             </a:lvl7pPr>
-            <a:lvl8pPr marL="2150669" indent="0">
-              <a:buNone/>
-              <a:defRPr sz="672"/>
+            <a:lvl8pPr marL="2173712" indent="0">
+              <a:buNone/>
+              <a:defRPr sz="679"/>
             </a:lvl8pPr>
-            <a:lvl9pPr marL="2457907" indent="0">
-              <a:buNone/>
-              <a:defRPr sz="672"/>
+            <a:lvl9pPr marL="2484242" indent="0">
+              <a:buNone/>
+              <a:defRPr sz="679"/>
             </a:lvl9pPr>
           </a:lstStyle>
           <a:p>
@@ -2093,7 +2098,7 @@
           <a:p>
             <a:fld id="{D4DB1356-5F01-43EB-828D-BA428F19442C}" type="datetimeFigureOut">
               <a:rPr lang="en-GB" smtClean="0"/>
-              <a:t>27/08/2018</a:t>
+              <a:t>21/10/2018</a:t>
             </a:fld>
             <a:endParaRPr lang="en-GB"/>
           </a:p>
@@ -2144,7 +2149,7 @@
     </p:spTree>
     <p:extLst>
       <p:ext uri="{BB962C8B-B14F-4D97-AF65-F5344CB8AC3E}">
-        <p14:creationId xmlns:p14="http://schemas.microsoft.com/office/powerpoint/2010/main" val="235690564"/>
+        <p14:creationId xmlns:p14="http://schemas.microsoft.com/office/powerpoint/2010/main" val="3480957273"/>
       </p:ext>
     </p:extLst>
   </p:cSld>
@@ -2183,15 +2188,15 @@
         </p:nvSpPr>
         <p:spPr>
           <a:xfrm>
-            <a:off x="570357" y="307234"/>
-            <a:ext cx="2670644" cy="1075320"/>
+            <a:off x="570357" y="336021"/>
+            <a:ext cx="2670644" cy="1176073"/>
           </a:xfrm>
         </p:spPr>
         <p:txBody>
           <a:bodyPr anchor="b"/>
           <a:lstStyle>
             <a:lvl1pPr>
-              <a:defRPr sz="2150"/>
+              <a:defRPr sz="2173"/>
             </a:lvl1pPr>
           </a:lstStyle>
           <a:p>
@@ -2215,8 +2220,8 @@
         </p:nvSpPr>
         <p:spPr>
           <a:xfrm>
-            <a:off x="3520248" y="663541"/>
-            <a:ext cx="4191953" cy="3275031"/>
+            <a:off x="3520248" y="725712"/>
+            <a:ext cx="4191953" cy="3581889"/>
           </a:xfrm>
         </p:spPr>
         <p:txBody>
@@ -2224,39 +2229,39 @@
           <a:lstStyle>
             <a:lvl1pPr marL="0" indent="0">
               <a:buNone/>
-              <a:defRPr sz="2150"/>
+              <a:defRPr sz="2173"/>
             </a:lvl1pPr>
-            <a:lvl2pPr marL="307238" indent="0">
-              <a:buNone/>
-              <a:defRPr sz="1882"/>
+            <a:lvl2pPr marL="310530" indent="0">
+              <a:buNone/>
+              <a:defRPr sz="1902"/>
             </a:lvl2pPr>
-            <a:lvl3pPr marL="614477" indent="0">
-              <a:buNone/>
-              <a:defRPr sz="1613"/>
+            <a:lvl3pPr marL="621060" indent="0">
+              <a:buNone/>
+              <a:defRPr sz="1630"/>
             </a:lvl3pPr>
-            <a:lvl4pPr marL="921715" indent="0">
-              <a:buNone/>
-              <a:defRPr sz="1344"/>
+            <a:lvl4pPr marL="931591" indent="0">
+              <a:buNone/>
+              <a:defRPr sz="1358"/>
             </a:lvl4pPr>
-            <a:lvl5pPr marL="1228954" indent="0">
-              <a:buNone/>
-              <a:defRPr sz="1344"/>
+            <a:lvl5pPr marL="1242121" indent="0">
+              <a:buNone/>
+              <a:defRPr sz="1358"/>
             </a:lvl5pPr>
-            <a:lvl6pPr marL="1536192" indent="0">
-              <a:buNone/>
-              <a:defRPr sz="1344"/>
+            <a:lvl6pPr marL="1552651" indent="0">
+              <a:buNone/>
+              <a:defRPr sz="1358"/>
             </a:lvl6pPr>
-            <a:lvl7pPr marL="1843430" indent="0">
-              <a:buNone/>
-              <a:defRPr sz="1344"/>
+            <a:lvl7pPr marL="1863181" indent="0">
+              <a:buNone/>
+              <a:defRPr sz="1358"/>
             </a:lvl7pPr>
-            <a:lvl8pPr marL="2150669" indent="0">
-              <a:buNone/>
-              <a:defRPr sz="1344"/>
+            <a:lvl8pPr marL="2173712" indent="0">
+              <a:buNone/>
+              <a:defRPr sz="1358"/>
             </a:lvl8pPr>
-            <a:lvl9pPr marL="2457907" indent="0">
-              <a:buNone/>
-              <a:defRPr sz="1344"/>
+            <a:lvl9pPr marL="2484242" indent="0">
+              <a:buNone/>
+              <a:defRPr sz="1358"/>
             </a:lvl9pPr>
           </a:lstStyle>
           <a:p>
@@ -2280,8 +2285,8 @@
         </p:nvSpPr>
         <p:spPr>
           <a:xfrm>
-            <a:off x="570357" y="1382554"/>
-            <a:ext cx="2670644" cy="2561352"/>
+            <a:off x="570357" y="1512094"/>
+            <a:ext cx="2670644" cy="2801341"/>
           </a:xfrm>
         </p:spPr>
         <p:txBody>
@@ -2289,39 +2294,39 @@
           <a:lstStyle>
             <a:lvl1pPr marL="0" indent="0">
               <a:buNone/>
-              <a:defRPr sz="1075"/>
+              <a:defRPr sz="1087"/>
             </a:lvl1pPr>
-            <a:lvl2pPr marL="307238" indent="0">
-              <a:buNone/>
-              <a:defRPr sz="941"/>
+            <a:lvl2pPr marL="310530" indent="0">
+              <a:buNone/>
+              <a:defRPr sz="951"/>
             </a:lvl2pPr>
-            <a:lvl3pPr marL="614477" indent="0">
-              <a:buNone/>
-              <a:defRPr sz="806"/>
+            <a:lvl3pPr marL="621060" indent="0">
+              <a:buNone/>
+              <a:defRPr sz="815"/>
             </a:lvl3pPr>
-            <a:lvl4pPr marL="921715" indent="0">
-              <a:buNone/>
-              <a:defRPr sz="672"/>
+            <a:lvl4pPr marL="931591" indent="0">
+              <a:buNone/>
+              <a:defRPr sz="679"/>
             </a:lvl4pPr>
-            <a:lvl5pPr marL="1228954" indent="0">
-              <a:buNone/>
-              <a:defRPr sz="672"/>
+            <a:lvl5pPr marL="1242121" indent="0">
+              <a:buNone/>
+              <a:defRPr sz="679"/>
             </a:lvl5pPr>
-            <a:lvl6pPr marL="1536192" indent="0">
-              <a:buNone/>
-              <a:defRPr sz="672"/>
+            <a:lvl6pPr marL="1552651" indent="0">
+              <a:buNone/>
+              <a:defRPr sz="679"/>
             </a:lvl6pPr>
-            <a:lvl7pPr marL="1843430" indent="0">
-              <a:buNone/>
-              <a:defRPr sz="672"/>
+            <a:lvl7pPr marL="1863181" indent="0">
+              <a:buNone/>
+              <a:defRPr sz="679"/>
             </a:lvl7pPr>
-            <a:lvl8pPr marL="2150669" indent="0">
-              <a:buNone/>
-              <a:defRPr sz="672"/>
+            <a:lvl8pPr marL="2173712" indent="0">
+              <a:buNone/>
+              <a:defRPr sz="679"/>
             </a:lvl8pPr>
-            <a:lvl9pPr marL="2457907" indent="0">
-              <a:buNone/>
-              <a:defRPr sz="672"/>
+            <a:lvl9pPr marL="2484242" indent="0">
+              <a:buNone/>
+              <a:defRPr sz="679"/>
             </a:lvl9pPr>
           </a:lstStyle>
           <a:p>
@@ -2350,7 +2355,7 @@
           <a:p>
             <a:fld id="{D4DB1356-5F01-43EB-828D-BA428F19442C}" type="datetimeFigureOut">
               <a:rPr lang="en-GB" smtClean="0"/>
-              <a:t>27/08/2018</a:t>
+              <a:t>21/10/2018</a:t>
             </a:fld>
             <a:endParaRPr lang="en-GB"/>
           </a:p>
@@ -2401,7 +2406,7 @@
     </p:spTree>
     <p:extLst>
       <p:ext uri="{BB962C8B-B14F-4D97-AF65-F5344CB8AC3E}">
-        <p14:creationId xmlns:p14="http://schemas.microsoft.com/office/powerpoint/2010/main" val="762181642"/>
+        <p14:creationId xmlns:p14="http://schemas.microsoft.com/office/powerpoint/2010/main" val="2120646961"/>
       </p:ext>
     </p:extLst>
   </p:cSld>
@@ -2445,8 +2450,8 @@
         </p:nvSpPr>
         <p:spPr>
           <a:xfrm>
-            <a:off x="569278" y="245361"/>
-            <a:ext cx="7141845" cy="890766"/>
+            <a:off x="569278" y="268350"/>
+            <a:ext cx="7141845" cy="974228"/>
           </a:xfrm>
           <a:prstGeom prst="rect">
             <a:avLst/>
@@ -2478,8 +2483,8 @@
         </p:nvSpPr>
         <p:spPr>
           <a:xfrm>
-            <a:off x="569278" y="1226803"/>
-            <a:ext cx="7141845" cy="2924059"/>
+            <a:off x="569278" y="1341750"/>
+            <a:ext cx="7141845" cy="3198032"/>
           </a:xfrm>
           <a:prstGeom prst="rect">
             <a:avLst/>
@@ -2540,8 +2545,8 @@
         </p:nvSpPr>
         <p:spPr>
           <a:xfrm>
-            <a:off x="569278" y="4271409"/>
-            <a:ext cx="1863090" cy="245361"/>
+            <a:off x="569278" y="4671624"/>
+            <a:ext cx="1863090" cy="268350"/>
           </a:xfrm>
           <a:prstGeom prst="rect">
             <a:avLst/>
@@ -2551,7 +2556,7 @@
           <a:bodyPr vert="horz" lIns="91440" tIns="45720" rIns="91440" bIns="45720" rtlCol="0" anchor="ctr"/>
           <a:lstStyle>
             <a:lvl1pPr algn="l">
-              <a:defRPr sz="806">
+              <a:defRPr sz="815">
                 <a:solidFill>
                   <a:schemeClr val="tx1">
                     <a:tint val="75000"/>
@@ -2563,7 +2568,7 @@
           <a:p>
             <a:fld id="{D4DB1356-5F01-43EB-828D-BA428F19442C}" type="datetimeFigureOut">
               <a:rPr lang="en-GB" smtClean="0"/>
-              <a:t>27/08/2018</a:t>
+              <a:t>21/10/2018</a:t>
             </a:fld>
             <a:endParaRPr lang="en-GB"/>
           </a:p>
@@ -2581,8 +2586,8 @@
         </p:nvSpPr>
         <p:spPr>
           <a:xfrm>
-            <a:off x="2742883" y="4271409"/>
-            <a:ext cx="2794635" cy="245361"/>
+            <a:off x="2742883" y="4671624"/>
+            <a:ext cx="2794635" cy="268350"/>
           </a:xfrm>
           <a:prstGeom prst="rect">
             <a:avLst/>
@@ -2592,7 +2597,7 @@
           <a:bodyPr vert="horz" lIns="91440" tIns="45720" rIns="91440" bIns="45720" rtlCol="0" anchor="ctr"/>
           <a:lstStyle>
             <a:lvl1pPr algn="ctr">
-              <a:defRPr sz="806">
+              <a:defRPr sz="815">
                 <a:solidFill>
                   <a:schemeClr val="tx1">
                     <a:tint val="75000"/>
@@ -2618,8 +2623,8 @@
         </p:nvSpPr>
         <p:spPr>
           <a:xfrm>
-            <a:off x="5848033" y="4271409"/>
-            <a:ext cx="1863090" cy="245361"/>
+            <a:off x="5848033" y="4671624"/>
+            <a:ext cx="1863090" cy="268350"/>
           </a:xfrm>
           <a:prstGeom prst="rect">
             <a:avLst/>
@@ -2629,7 +2634,7 @@
           <a:bodyPr vert="horz" lIns="91440" tIns="45720" rIns="91440" bIns="45720" rtlCol="0" anchor="ctr"/>
           <a:lstStyle>
             <a:lvl1pPr algn="r">
-              <a:defRPr sz="806">
+              <a:defRPr sz="815">
                 <a:solidFill>
                   <a:schemeClr val="tx1">
                     <a:tint val="75000"/>
@@ -2650,27 +2655,27 @@
     </p:spTree>
     <p:extLst>
       <p:ext uri="{BB962C8B-B14F-4D97-AF65-F5344CB8AC3E}">
-        <p14:creationId xmlns:p14="http://schemas.microsoft.com/office/powerpoint/2010/main" val="2026119420"/>
+        <p14:creationId xmlns:p14="http://schemas.microsoft.com/office/powerpoint/2010/main" val="4239327975"/>
       </p:ext>
     </p:extLst>
   </p:cSld>
   <p:clrMap bg1="lt1" tx1="dk1" bg2="lt2" tx2="dk2" accent1="accent1" accent2="accent2" accent3="accent3" accent4="accent4" accent5="accent5" accent6="accent6" hlink="hlink" folHlink="folHlink"/>
   <p:sldLayoutIdLst>
-    <p:sldLayoutId id="2147483661" r:id="rId1"/>
-    <p:sldLayoutId id="2147483662" r:id="rId2"/>
-    <p:sldLayoutId id="2147483663" r:id="rId3"/>
-    <p:sldLayoutId id="2147483664" r:id="rId4"/>
-    <p:sldLayoutId id="2147483665" r:id="rId5"/>
-    <p:sldLayoutId id="2147483666" r:id="rId6"/>
-    <p:sldLayoutId id="2147483667" r:id="rId7"/>
-    <p:sldLayoutId id="2147483668" r:id="rId8"/>
-    <p:sldLayoutId id="2147483669" r:id="rId9"/>
-    <p:sldLayoutId id="2147483670" r:id="rId10"/>
-    <p:sldLayoutId id="2147483671" r:id="rId11"/>
+    <p:sldLayoutId id="2147483685" r:id="rId1"/>
+    <p:sldLayoutId id="2147483686" r:id="rId2"/>
+    <p:sldLayoutId id="2147483687" r:id="rId3"/>
+    <p:sldLayoutId id="2147483688" r:id="rId4"/>
+    <p:sldLayoutId id="2147483689" r:id="rId5"/>
+    <p:sldLayoutId id="2147483690" r:id="rId6"/>
+    <p:sldLayoutId id="2147483691" r:id="rId7"/>
+    <p:sldLayoutId id="2147483692" r:id="rId8"/>
+    <p:sldLayoutId id="2147483693" r:id="rId9"/>
+    <p:sldLayoutId id="2147483694" r:id="rId10"/>
+    <p:sldLayoutId id="2147483695" r:id="rId11"/>
   </p:sldLayoutIdLst>
   <p:txStyles>
     <p:titleStyle>
-      <a:lvl1pPr algn="l" defTabSz="614477" rtl="0" eaLnBrk="1" latinLnBrk="0" hangingPunct="1">
+      <a:lvl1pPr algn="l" defTabSz="621060" rtl="0" eaLnBrk="1" latinLnBrk="0" hangingPunct="1">
         <a:lnSpc>
           <a:spcPct val="90000"/>
         </a:lnSpc>
@@ -2678,7 +2683,7 @@
           <a:spcPct val="0"/>
         </a:spcBef>
         <a:buNone/>
-        <a:defRPr sz="2957" kern="1200">
+        <a:defRPr sz="2988" kern="1200">
           <a:solidFill>
             <a:schemeClr val="tx1"/>
           </a:solidFill>
@@ -2689,16 +2694,16 @@
       </a:lvl1pPr>
     </p:titleStyle>
     <p:bodyStyle>
-      <a:lvl1pPr marL="153619" indent="-153619" algn="l" defTabSz="614477" rtl="0" eaLnBrk="1" latinLnBrk="0" hangingPunct="1">
+      <a:lvl1pPr marL="155265" indent="-155265" algn="l" defTabSz="621060" rtl="0" eaLnBrk="1" latinLnBrk="0" hangingPunct="1">
         <a:lnSpc>
           <a:spcPct val="90000"/>
         </a:lnSpc>
         <a:spcBef>
-          <a:spcPts val="672"/>
+          <a:spcPts val="679"/>
         </a:spcBef>
         <a:buFont typeface="Arial" panose="020B0604020202020204" pitchFamily="34" charset="0"/>
         <a:buChar char="•"/>
-        <a:defRPr sz="1882" kern="1200">
+        <a:defRPr sz="1902" kern="1200">
           <a:solidFill>
             <a:schemeClr val="tx1"/>
           </a:solidFill>
@@ -2707,16 +2712,16 @@
           <a:cs typeface="+mn-cs"/>
         </a:defRPr>
       </a:lvl1pPr>
-      <a:lvl2pPr marL="460858" indent="-153619" algn="l" defTabSz="614477" rtl="0" eaLnBrk="1" latinLnBrk="0" hangingPunct="1">
+      <a:lvl2pPr marL="465795" indent="-155265" algn="l" defTabSz="621060" rtl="0" eaLnBrk="1" latinLnBrk="0" hangingPunct="1">
         <a:lnSpc>
           <a:spcPct val="90000"/>
         </a:lnSpc>
         <a:spcBef>
-          <a:spcPts val="336"/>
+          <a:spcPts val="340"/>
         </a:spcBef>
         <a:buFont typeface="Arial" panose="020B0604020202020204" pitchFamily="34" charset="0"/>
         <a:buChar char="•"/>
-        <a:defRPr sz="1613" kern="1200">
+        <a:defRPr sz="1630" kern="1200">
           <a:solidFill>
             <a:schemeClr val="tx1"/>
           </a:solidFill>
@@ -2725,16 +2730,16 @@
           <a:cs typeface="+mn-cs"/>
         </a:defRPr>
       </a:lvl2pPr>
-      <a:lvl3pPr marL="768096" indent="-153619" algn="l" defTabSz="614477" rtl="0" eaLnBrk="1" latinLnBrk="0" hangingPunct="1">
+      <a:lvl3pPr marL="776326" indent="-155265" algn="l" defTabSz="621060" rtl="0" eaLnBrk="1" latinLnBrk="0" hangingPunct="1">
         <a:lnSpc>
           <a:spcPct val="90000"/>
         </a:lnSpc>
         <a:spcBef>
-          <a:spcPts val="336"/>
+          <a:spcPts val="340"/>
         </a:spcBef>
         <a:buFont typeface="Arial" panose="020B0604020202020204" pitchFamily="34" charset="0"/>
         <a:buChar char="•"/>
-        <a:defRPr sz="1344" kern="1200">
+        <a:defRPr sz="1358" kern="1200">
           <a:solidFill>
             <a:schemeClr val="tx1"/>
           </a:solidFill>
@@ -2743,16 +2748,16 @@
           <a:cs typeface="+mn-cs"/>
         </a:defRPr>
       </a:lvl3pPr>
-      <a:lvl4pPr marL="1075334" indent="-153619" algn="l" defTabSz="614477" rtl="0" eaLnBrk="1" latinLnBrk="0" hangingPunct="1">
+      <a:lvl4pPr marL="1086856" indent="-155265" algn="l" defTabSz="621060" rtl="0" eaLnBrk="1" latinLnBrk="0" hangingPunct="1">
         <a:lnSpc>
           <a:spcPct val="90000"/>
         </a:lnSpc>
         <a:spcBef>
-          <a:spcPts val="336"/>
+          <a:spcPts val="340"/>
         </a:spcBef>
         <a:buFont typeface="Arial" panose="020B0604020202020204" pitchFamily="34" charset="0"/>
         <a:buChar char="•"/>
-        <a:defRPr sz="1210" kern="1200">
+        <a:defRPr sz="1223" kern="1200">
           <a:solidFill>
             <a:schemeClr val="tx1"/>
           </a:solidFill>
@@ -2761,16 +2766,16 @@
           <a:cs typeface="+mn-cs"/>
         </a:defRPr>
       </a:lvl4pPr>
-      <a:lvl5pPr marL="1382573" indent="-153619" algn="l" defTabSz="614477" rtl="0" eaLnBrk="1" latinLnBrk="0" hangingPunct="1">
+      <a:lvl5pPr marL="1397386" indent="-155265" algn="l" defTabSz="621060" rtl="0" eaLnBrk="1" latinLnBrk="0" hangingPunct="1">
         <a:lnSpc>
           <a:spcPct val="90000"/>
         </a:lnSpc>
         <a:spcBef>
-          <a:spcPts val="336"/>
+          <a:spcPts val="340"/>
         </a:spcBef>
         <a:buFont typeface="Arial" panose="020B0604020202020204" pitchFamily="34" charset="0"/>
         <a:buChar char="•"/>
-        <a:defRPr sz="1210" kern="1200">
+        <a:defRPr sz="1223" kern="1200">
           <a:solidFill>
             <a:schemeClr val="tx1"/>
           </a:solidFill>
@@ -2779,16 +2784,16 @@
           <a:cs typeface="+mn-cs"/>
         </a:defRPr>
       </a:lvl5pPr>
-      <a:lvl6pPr marL="1689811" indent="-153619" algn="l" defTabSz="614477" rtl="0" eaLnBrk="1" latinLnBrk="0" hangingPunct="1">
+      <a:lvl6pPr marL="1707916" indent="-155265" algn="l" defTabSz="621060" rtl="0" eaLnBrk="1" latinLnBrk="0" hangingPunct="1">
         <a:lnSpc>
           <a:spcPct val="90000"/>
         </a:lnSpc>
         <a:spcBef>
-          <a:spcPts val="336"/>
+          <a:spcPts val="340"/>
         </a:spcBef>
         <a:buFont typeface="Arial" panose="020B0604020202020204" pitchFamily="34" charset="0"/>
         <a:buChar char="•"/>
-        <a:defRPr sz="1210" kern="1200">
+        <a:defRPr sz="1223" kern="1200">
           <a:solidFill>
             <a:schemeClr val="tx1"/>
           </a:solidFill>
@@ -2797,16 +2802,16 @@
           <a:cs typeface="+mn-cs"/>
         </a:defRPr>
       </a:lvl6pPr>
-      <a:lvl7pPr marL="1997050" indent="-153619" algn="l" defTabSz="614477" rtl="0" eaLnBrk="1" latinLnBrk="0" hangingPunct="1">
+      <a:lvl7pPr marL="2018447" indent="-155265" algn="l" defTabSz="621060" rtl="0" eaLnBrk="1" latinLnBrk="0" hangingPunct="1">
         <a:lnSpc>
           <a:spcPct val="90000"/>
         </a:lnSpc>
         <a:spcBef>
-          <a:spcPts val="336"/>
+          <a:spcPts val="340"/>
         </a:spcBef>
         <a:buFont typeface="Arial" panose="020B0604020202020204" pitchFamily="34" charset="0"/>
         <a:buChar char="•"/>
-        <a:defRPr sz="1210" kern="1200">
+        <a:defRPr sz="1223" kern="1200">
           <a:solidFill>
             <a:schemeClr val="tx1"/>
           </a:solidFill>
@@ -2815,16 +2820,16 @@
           <a:cs typeface="+mn-cs"/>
         </a:defRPr>
       </a:lvl7pPr>
-      <a:lvl8pPr marL="2304288" indent="-153619" algn="l" defTabSz="614477" rtl="0" eaLnBrk="1" latinLnBrk="0" hangingPunct="1">
+      <a:lvl8pPr marL="2328977" indent="-155265" algn="l" defTabSz="621060" rtl="0" eaLnBrk="1" latinLnBrk="0" hangingPunct="1">
         <a:lnSpc>
           <a:spcPct val="90000"/>
         </a:lnSpc>
         <a:spcBef>
-          <a:spcPts val="336"/>
+          <a:spcPts val="340"/>
         </a:spcBef>
         <a:buFont typeface="Arial" panose="020B0604020202020204" pitchFamily="34" charset="0"/>
         <a:buChar char="•"/>
-        <a:defRPr sz="1210" kern="1200">
+        <a:defRPr sz="1223" kern="1200">
           <a:solidFill>
             <a:schemeClr val="tx1"/>
           </a:solidFill>
@@ -2833,16 +2838,16 @@
           <a:cs typeface="+mn-cs"/>
         </a:defRPr>
       </a:lvl8pPr>
-      <a:lvl9pPr marL="2611526" indent="-153619" algn="l" defTabSz="614477" rtl="0" eaLnBrk="1" latinLnBrk="0" hangingPunct="1">
+      <a:lvl9pPr marL="2639507" indent="-155265" algn="l" defTabSz="621060" rtl="0" eaLnBrk="1" latinLnBrk="0" hangingPunct="1">
         <a:lnSpc>
           <a:spcPct val="90000"/>
         </a:lnSpc>
         <a:spcBef>
-          <a:spcPts val="336"/>
+          <a:spcPts val="340"/>
         </a:spcBef>
         <a:buFont typeface="Arial" panose="020B0604020202020204" pitchFamily="34" charset="0"/>
         <a:buChar char="•"/>
-        <a:defRPr sz="1210" kern="1200">
+        <a:defRPr sz="1223" kern="1200">
           <a:solidFill>
             <a:schemeClr val="tx1"/>
           </a:solidFill>
@@ -2856,8 +2861,8 @@
       <a:defPPr>
         <a:defRPr lang="en-US"/>
       </a:defPPr>
-      <a:lvl1pPr marL="0" algn="l" defTabSz="614477" rtl="0" eaLnBrk="1" latinLnBrk="0" hangingPunct="1">
-        <a:defRPr sz="1210" kern="1200">
+      <a:lvl1pPr marL="0" algn="l" defTabSz="621060" rtl="0" eaLnBrk="1" latinLnBrk="0" hangingPunct="1">
+        <a:defRPr sz="1223" kern="1200">
           <a:solidFill>
             <a:schemeClr val="tx1"/>
           </a:solidFill>
@@ -2866,8 +2871,8 @@
           <a:cs typeface="+mn-cs"/>
         </a:defRPr>
       </a:lvl1pPr>
-      <a:lvl2pPr marL="307238" algn="l" defTabSz="614477" rtl="0" eaLnBrk="1" latinLnBrk="0" hangingPunct="1">
-        <a:defRPr sz="1210" kern="1200">
+      <a:lvl2pPr marL="310530" algn="l" defTabSz="621060" rtl="0" eaLnBrk="1" latinLnBrk="0" hangingPunct="1">
+        <a:defRPr sz="1223" kern="1200">
           <a:solidFill>
             <a:schemeClr val="tx1"/>
           </a:solidFill>
@@ -2876,8 +2881,8 @@
           <a:cs typeface="+mn-cs"/>
         </a:defRPr>
       </a:lvl2pPr>
-      <a:lvl3pPr marL="614477" algn="l" defTabSz="614477" rtl="0" eaLnBrk="1" latinLnBrk="0" hangingPunct="1">
-        <a:defRPr sz="1210" kern="1200">
+      <a:lvl3pPr marL="621060" algn="l" defTabSz="621060" rtl="0" eaLnBrk="1" latinLnBrk="0" hangingPunct="1">
+        <a:defRPr sz="1223" kern="1200">
           <a:solidFill>
             <a:schemeClr val="tx1"/>
           </a:solidFill>
@@ -2886,8 +2891,8 @@
           <a:cs typeface="+mn-cs"/>
         </a:defRPr>
       </a:lvl3pPr>
-      <a:lvl4pPr marL="921715" algn="l" defTabSz="614477" rtl="0" eaLnBrk="1" latinLnBrk="0" hangingPunct="1">
-        <a:defRPr sz="1210" kern="1200">
+      <a:lvl4pPr marL="931591" algn="l" defTabSz="621060" rtl="0" eaLnBrk="1" latinLnBrk="0" hangingPunct="1">
+        <a:defRPr sz="1223" kern="1200">
           <a:solidFill>
             <a:schemeClr val="tx1"/>
           </a:solidFill>
@@ -2896,8 +2901,8 @@
           <a:cs typeface="+mn-cs"/>
         </a:defRPr>
       </a:lvl4pPr>
-      <a:lvl5pPr marL="1228954" algn="l" defTabSz="614477" rtl="0" eaLnBrk="1" latinLnBrk="0" hangingPunct="1">
-        <a:defRPr sz="1210" kern="1200">
+      <a:lvl5pPr marL="1242121" algn="l" defTabSz="621060" rtl="0" eaLnBrk="1" latinLnBrk="0" hangingPunct="1">
+        <a:defRPr sz="1223" kern="1200">
           <a:solidFill>
             <a:schemeClr val="tx1"/>
           </a:solidFill>
@@ -2906,8 +2911,8 @@
           <a:cs typeface="+mn-cs"/>
         </a:defRPr>
       </a:lvl5pPr>
-      <a:lvl6pPr marL="1536192" algn="l" defTabSz="614477" rtl="0" eaLnBrk="1" latinLnBrk="0" hangingPunct="1">
-        <a:defRPr sz="1210" kern="1200">
+      <a:lvl6pPr marL="1552651" algn="l" defTabSz="621060" rtl="0" eaLnBrk="1" latinLnBrk="0" hangingPunct="1">
+        <a:defRPr sz="1223" kern="1200">
           <a:solidFill>
             <a:schemeClr val="tx1"/>
           </a:solidFill>
@@ -2916,8 +2921,8 @@
           <a:cs typeface="+mn-cs"/>
         </a:defRPr>
       </a:lvl6pPr>
-      <a:lvl7pPr marL="1843430" algn="l" defTabSz="614477" rtl="0" eaLnBrk="1" latinLnBrk="0" hangingPunct="1">
-        <a:defRPr sz="1210" kern="1200">
+      <a:lvl7pPr marL="1863181" algn="l" defTabSz="621060" rtl="0" eaLnBrk="1" latinLnBrk="0" hangingPunct="1">
+        <a:defRPr sz="1223" kern="1200">
           <a:solidFill>
             <a:schemeClr val="tx1"/>
           </a:solidFill>
@@ -2926,8 +2931,8 @@
           <a:cs typeface="+mn-cs"/>
         </a:defRPr>
       </a:lvl7pPr>
-      <a:lvl8pPr marL="2150669" algn="l" defTabSz="614477" rtl="0" eaLnBrk="1" latinLnBrk="0" hangingPunct="1">
-        <a:defRPr sz="1210" kern="1200">
+      <a:lvl8pPr marL="2173712" algn="l" defTabSz="621060" rtl="0" eaLnBrk="1" latinLnBrk="0" hangingPunct="1">
+        <a:defRPr sz="1223" kern="1200">
           <a:solidFill>
             <a:schemeClr val="tx1"/>
           </a:solidFill>
@@ -2936,8 +2941,8 @@
           <a:cs typeface="+mn-cs"/>
         </a:defRPr>
       </a:lvl8pPr>
-      <a:lvl9pPr marL="2457907" algn="l" defTabSz="614477" rtl="0" eaLnBrk="1" latinLnBrk="0" hangingPunct="1">
-        <a:defRPr sz="1210" kern="1200">
+      <a:lvl9pPr marL="2484242" algn="l" defTabSz="621060" rtl="0" eaLnBrk="1" latinLnBrk="0" hangingPunct="1">
+        <a:defRPr sz="1223" kern="1200">
           <a:solidFill>
             <a:schemeClr val="tx1"/>
           </a:solidFill>
@@ -2989,7 +2994,7 @@
         </p:blipFill>
         <p:spPr>
           <a:xfrm>
-            <a:off x="98207" y="36305"/>
+            <a:off x="98207" y="29955"/>
             <a:ext cx="2428604" cy="4534330"/>
           </a:xfrm>
           <a:prstGeom prst="rect">
@@ -3019,7 +3024,7 @@
         </p:blipFill>
         <p:spPr>
           <a:xfrm>
-            <a:off x="2579200" y="36305"/>
+            <a:off x="2579202" y="29955"/>
             <a:ext cx="3106611" cy="4534330"/>
           </a:xfrm>
           <a:prstGeom prst="rect">
@@ -3049,7 +3054,7 @@
         </p:blipFill>
         <p:spPr>
           <a:xfrm>
-            <a:off x="5738197" y="1956357"/>
+            <a:off x="5738197" y="1950007"/>
             <a:ext cx="2428604" cy="2614278"/>
           </a:xfrm>
           <a:prstGeom prst="rect">
@@ -3057,6 +3062,120 @@
           </a:prstGeom>
         </p:spPr>
       </p:pic>
+      <p:sp>
+        <p:nvSpPr>
+          <p:cNvPr id="2" name="TextBox 1">
+            <a:extLst>
+              <a:ext uri="{FF2B5EF4-FFF2-40B4-BE49-F238E27FC236}">
+                <a16:creationId xmlns:a16="http://schemas.microsoft.com/office/drawing/2014/main" id="{C99D067A-30F5-4B05-AAB2-3EBD5F7BE562}"/>
+              </a:ext>
+            </a:extLst>
+          </p:cNvPr>
+          <p:cNvSpPr txBox="1"/>
+          <p:nvPr/>
+        </p:nvSpPr>
+        <p:spPr>
+          <a:xfrm>
+            <a:off x="1091936" y="4670981"/>
+            <a:ext cx="441146" cy="369332"/>
+          </a:xfrm>
+          <a:prstGeom prst="rect">
+            <a:avLst/>
+          </a:prstGeom>
+          <a:noFill/>
+        </p:spPr>
+        <p:txBody>
+          <a:bodyPr wrap="none" rtlCol="0">
+            <a:spAutoFit/>
+          </a:bodyPr>
+          <a:lstStyle/>
+          <a:p>
+            <a:r>
+              <a:rPr lang="en-GB" dirty="0">
+                <a:latin typeface="Times New Roman" panose="02020603050405020304" pitchFamily="18" charset="0"/>
+                <a:cs typeface="Times New Roman" panose="02020603050405020304" pitchFamily="18" charset="0"/>
+              </a:rPr>
+              <a:t>(a)</a:t>
+            </a:r>
+          </a:p>
+        </p:txBody>
+      </p:sp>
+      <p:sp>
+        <p:nvSpPr>
+          <p:cNvPr id="7" name="TextBox 6">
+            <a:extLst>
+              <a:ext uri="{FF2B5EF4-FFF2-40B4-BE49-F238E27FC236}">
+                <a16:creationId xmlns:a16="http://schemas.microsoft.com/office/drawing/2014/main" id="{F7A8CDBF-81C6-405D-9F0B-E7FA6695343F}"/>
+              </a:ext>
+            </a:extLst>
+          </p:cNvPr>
+          <p:cNvSpPr txBox="1"/>
+          <p:nvPr/>
+        </p:nvSpPr>
+        <p:spPr>
+          <a:xfrm>
+            <a:off x="3919627" y="4670981"/>
+            <a:ext cx="453970" cy="369332"/>
+          </a:xfrm>
+          <a:prstGeom prst="rect">
+            <a:avLst/>
+          </a:prstGeom>
+          <a:noFill/>
+        </p:spPr>
+        <p:txBody>
+          <a:bodyPr wrap="none" rtlCol="0">
+            <a:spAutoFit/>
+          </a:bodyPr>
+          <a:lstStyle/>
+          <a:p>
+            <a:r>
+              <a:rPr lang="en-GB" dirty="0">
+                <a:latin typeface="Times New Roman" panose="02020603050405020304" pitchFamily="18" charset="0"/>
+                <a:cs typeface="Times New Roman" panose="02020603050405020304" pitchFamily="18" charset="0"/>
+              </a:rPr>
+              <a:t>(b)</a:t>
+            </a:r>
+          </a:p>
+        </p:txBody>
+      </p:sp>
+      <p:sp>
+        <p:nvSpPr>
+          <p:cNvPr id="8" name="TextBox 7">
+            <a:extLst>
+              <a:ext uri="{FF2B5EF4-FFF2-40B4-BE49-F238E27FC236}">
+                <a16:creationId xmlns:a16="http://schemas.microsoft.com/office/drawing/2014/main" id="{7E025598-FC56-40BE-811B-DAE61B02650B}"/>
+              </a:ext>
+            </a:extLst>
+          </p:cNvPr>
+          <p:cNvSpPr txBox="1"/>
+          <p:nvPr/>
+        </p:nvSpPr>
+        <p:spPr>
+          <a:xfrm>
+            <a:off x="6731926" y="4670981"/>
+            <a:ext cx="441146" cy="369332"/>
+          </a:xfrm>
+          <a:prstGeom prst="rect">
+            <a:avLst/>
+          </a:prstGeom>
+          <a:noFill/>
+        </p:spPr>
+        <p:txBody>
+          <a:bodyPr wrap="none" rtlCol="0">
+            <a:spAutoFit/>
+          </a:bodyPr>
+          <a:lstStyle/>
+          <a:p>
+            <a:r>
+              <a:rPr lang="en-GB" dirty="0">
+                <a:latin typeface="Times New Roman" panose="02020603050405020304" pitchFamily="18" charset="0"/>
+                <a:cs typeface="Times New Roman" panose="02020603050405020304" pitchFamily="18" charset="0"/>
+              </a:rPr>
+              <a:t>(c)</a:t>
+            </a:r>
+          </a:p>
+        </p:txBody>
+      </p:sp>
     </p:spTree>
     <p:extLst>
       <p:ext uri="{BB962C8B-B14F-4D97-AF65-F5344CB8AC3E}">

</xml_diff>